<commit_message>
added some docs for report and image making
</commit_message>
<xml_diff>
--- a/ppt/Presentatie1.pptx
+++ b/ppt/Presentatie1.pptx
@@ -121,10 +121,41 @@
   <pc:docChgLst>
     <pc:chgData name="Mattice Criel" userId="760da0b4365675d4" providerId="LiveId" clId="{D78CC512-A6A2-4AFE-B98D-C1088BDDB92F}"/>
     <pc:docChg chg="custSel addSld modSld">
-      <pc:chgData name="Mattice Criel" userId="760da0b4365675d4" providerId="LiveId" clId="{D78CC512-A6A2-4AFE-B98D-C1088BDDB92F}" dt="2025-12-04T13:35:51.834" v="73" actId="1076"/>
+      <pc:chgData name="Mattice Criel" userId="760da0b4365675d4" providerId="LiveId" clId="{D78CC512-A6A2-4AFE-B98D-C1088BDDB92F}" dt="2025-12-05T10:09:47.625" v="105" actId="1076"/>
       <pc:docMkLst>
         <pc:docMk/>
       </pc:docMkLst>
+      <pc:sldChg chg="modSp mod">
+        <pc:chgData name="Mattice Criel" userId="760da0b4365675d4" providerId="LiveId" clId="{D78CC512-A6A2-4AFE-B98D-C1088BDDB92F}" dt="2025-12-05T10:09:47.625" v="105" actId="1076"/>
+        <pc:sldMkLst>
+          <pc:docMk/>
+          <pc:sldMk cId="917242716" sldId="256"/>
+        </pc:sldMkLst>
+        <pc:spChg chg="mod">
+          <ac:chgData name="Mattice Criel" userId="760da0b4365675d4" providerId="LiveId" clId="{D78CC512-A6A2-4AFE-B98D-C1088BDDB92F}" dt="2025-12-05T10:09:47.625" v="105" actId="1076"/>
+          <ac:spMkLst>
+            <pc:docMk/>
+            <pc:sldMk cId="917242716" sldId="256"/>
+            <ac:spMk id="32" creationId="{8C53961F-93C8-E670-5BEA-4360950D0166}"/>
+          </ac:spMkLst>
+        </pc:spChg>
+        <pc:spChg chg="mod">
+          <ac:chgData name="Mattice Criel" userId="760da0b4365675d4" providerId="LiveId" clId="{D78CC512-A6A2-4AFE-B98D-C1088BDDB92F}" dt="2025-12-05T10:09:42.732" v="104" actId="1076"/>
+          <ac:spMkLst>
+            <pc:docMk/>
+            <pc:sldMk cId="917242716" sldId="256"/>
+            <ac:spMk id="36" creationId="{3AB0D9F0-F8B2-15E4-38E1-EA1E154E4472}"/>
+          </ac:spMkLst>
+        </pc:spChg>
+        <pc:cxnChg chg="mod">
+          <ac:chgData name="Mattice Criel" userId="760da0b4365675d4" providerId="LiveId" clId="{D78CC512-A6A2-4AFE-B98D-C1088BDDB92F}" dt="2025-12-05T10:09:34.471" v="103" actId="1036"/>
+          <ac:cxnSpMkLst>
+            <pc:docMk/>
+            <pc:sldMk cId="917242716" sldId="256"/>
+            <ac:cxnSpMk id="33" creationId="{A3D7B9C8-5C7B-8EB9-6C35-29B59FD0113B}"/>
+          </ac:cxnSpMkLst>
+        </pc:cxnChg>
+      </pc:sldChg>
       <pc:sldChg chg="addSp delSp modSp new mod">
         <pc:chgData name="Mattice Criel" userId="760da0b4365675d4" providerId="LiveId" clId="{D78CC512-A6A2-4AFE-B98D-C1088BDDB92F}" dt="2025-12-04T13:35:51.834" v="73" actId="1076"/>
         <pc:sldMkLst>
@@ -3996,8 +4027,8 @@
           </p:nvSpPr>
           <p:spPr>
             <a:xfrm>
-              <a:off x="8497483" y="2239287"/>
-              <a:ext cx="1826388" cy="487978"/>
+              <a:off x="8497482" y="2061309"/>
+              <a:ext cx="1826388" cy="843933"/>
             </a:xfrm>
             <a:prstGeom prst="roundRect">
               <a:avLst>
@@ -4025,6 +4056,10 @@
             <a:p>
               <a:pPr algn="ctr"/>
               <a:r>
+                <a:rPr lang="en-US" dirty="0"/>
+                <a:t>Nested CV </a:t>
+              </a:r>
+              <a:r>
                 <a:rPr lang="en-US" dirty="0" err="1"/>
                 <a:t>LightGBM</a:t>
               </a:r>
@@ -4048,7 +4083,7 @@
           </p:nvCxnSpPr>
           <p:spPr>
             <a:xfrm>
-              <a:off x="9360248" y="2876022"/>
+              <a:off x="9360248" y="3092330"/>
               <a:ext cx="0" cy="1060198"/>
             </a:xfrm>
             <a:prstGeom prst="straightConnector1">
@@ -4087,7 +4122,7 @@
           </p:nvSpPr>
           <p:spPr>
             <a:xfrm>
-              <a:off x="9731434" y="3082955"/>
+              <a:off x="9731434" y="3268180"/>
               <a:ext cx="2145631" cy="646331"/>
             </a:xfrm>
             <a:prstGeom prst="rect">

</xml_diff>